<commit_message>
Added bullets for clustering
</commit_message>
<xml_diff>
--- a/presentation_materials/Poster.pptx
+++ b/presentation_materials/Poster.pptx
@@ -112,6 +112,10 @@
 </p:presentation>
 </file>
 
+<file path=ppt/revisionInfo.xml><?xml version="1.0" encoding="utf-8"?>
+<p1510:revInfo xmlns:a="http://schemas.openxmlformats.org/drawingml/2006/main" xmlns:r="http://schemas.openxmlformats.org/officeDocument/2006/relationships" xmlns:p1510="http://schemas.microsoft.com/office/powerpoint/2015/10/main"/>
+</file>
+
 <file path=ppt/slideLayouts/slideLayout1.xml><?xml version="1.0" encoding="utf-8"?>
 <p:sldLayout xmlns:a="http://schemas.openxmlformats.org/drawingml/2006/main" xmlns:r="http://schemas.openxmlformats.org/officeDocument/2006/relationships" xmlns:p="http://schemas.openxmlformats.org/presentationml/2006/main" type="title" preserve="1">
   <p:cSld name="Title Slide">
@@ -154,7 +158,7 @@
           </a:lstStyle>
           <a:p>
             <a:r>
-              <a:rPr lang="en-US" smtClean="0"/>
+              <a:rPr lang="en-US"/>
               <a:t>Click to edit Master title style</a:t>
             </a:r>
             <a:endParaRPr lang="en-US" dirty="0"/>
@@ -219,7 +223,7 @@
           </a:lstStyle>
           <a:p>
             <a:r>
-              <a:rPr lang="en-US" smtClean="0"/>
+              <a:rPr lang="en-US"/>
               <a:t>Click to edit Master subtitle style</a:t>
             </a:r>
             <a:endParaRPr lang="en-US" dirty="0"/>
@@ -243,7 +247,7 @@
           <a:p>
             <a:fld id="{CA4DEABC-F80B-F54D-B945-95EA34AC4842}" type="datetimeFigureOut">
               <a:rPr lang="en-US" smtClean="0"/>
-              <a:t>11/29/17</a:t>
+              <a:t>11/30/2017</a:t>
             </a:fld>
             <a:endParaRPr lang="en-US"/>
           </a:p>
@@ -332,7 +336,7 @@
           <a:lstStyle/>
           <a:p>
             <a:r>
-              <a:rPr lang="en-US" smtClean="0"/>
+              <a:rPr lang="en-US"/>
               <a:t>Click to edit Master title style</a:t>
             </a:r>
             <a:endParaRPr lang="en-US" dirty="0"/>
@@ -356,35 +360,35 @@
           <a:p>
             <a:pPr lvl="0"/>
             <a:r>
-              <a:rPr lang="en-US" smtClean="0"/>
+              <a:rPr lang="en-US"/>
               <a:t>Click to edit Master text styles</a:t>
             </a:r>
           </a:p>
           <a:p>
             <a:pPr lvl="1"/>
             <a:r>
-              <a:rPr lang="en-US" smtClean="0"/>
+              <a:rPr lang="en-US"/>
               <a:t>Second level</a:t>
             </a:r>
           </a:p>
           <a:p>
             <a:pPr lvl="2"/>
             <a:r>
-              <a:rPr lang="en-US" smtClean="0"/>
+              <a:rPr lang="en-US"/>
               <a:t>Third level</a:t>
             </a:r>
           </a:p>
           <a:p>
             <a:pPr lvl="3"/>
             <a:r>
-              <a:rPr lang="en-US" smtClean="0"/>
+              <a:rPr lang="en-US"/>
               <a:t>Fourth level</a:t>
             </a:r>
           </a:p>
           <a:p>
             <a:pPr lvl="4"/>
             <a:r>
-              <a:rPr lang="en-US" smtClean="0"/>
+              <a:rPr lang="en-US"/>
               <a:t>Fifth level</a:t>
             </a:r>
             <a:endParaRPr lang="en-US" dirty="0"/>
@@ -408,7 +412,7 @@
           <a:p>
             <a:fld id="{CA4DEABC-F80B-F54D-B945-95EA34AC4842}" type="datetimeFigureOut">
               <a:rPr lang="en-US" smtClean="0"/>
-              <a:t>11/29/17</a:t>
+              <a:t>11/30/2017</a:t>
             </a:fld>
             <a:endParaRPr lang="en-US"/>
           </a:p>
@@ -502,7 +506,7 @@
           <a:lstStyle/>
           <a:p>
             <a:r>
-              <a:rPr lang="en-US" smtClean="0"/>
+              <a:rPr lang="en-US"/>
               <a:t>Click to edit Master title style</a:t>
             </a:r>
             <a:endParaRPr lang="en-US" dirty="0"/>
@@ -531,35 +535,35 @@
           <a:p>
             <a:pPr lvl="0"/>
             <a:r>
-              <a:rPr lang="en-US" smtClean="0"/>
+              <a:rPr lang="en-US"/>
               <a:t>Click to edit Master text styles</a:t>
             </a:r>
           </a:p>
           <a:p>
             <a:pPr lvl="1"/>
             <a:r>
-              <a:rPr lang="en-US" smtClean="0"/>
+              <a:rPr lang="en-US"/>
               <a:t>Second level</a:t>
             </a:r>
           </a:p>
           <a:p>
             <a:pPr lvl="2"/>
             <a:r>
-              <a:rPr lang="en-US" smtClean="0"/>
+              <a:rPr lang="en-US"/>
               <a:t>Third level</a:t>
             </a:r>
           </a:p>
           <a:p>
             <a:pPr lvl="3"/>
             <a:r>
-              <a:rPr lang="en-US" smtClean="0"/>
+              <a:rPr lang="en-US"/>
               <a:t>Fourth level</a:t>
             </a:r>
           </a:p>
           <a:p>
             <a:pPr lvl="4"/>
             <a:r>
-              <a:rPr lang="en-US" smtClean="0"/>
+              <a:rPr lang="en-US"/>
               <a:t>Fifth level</a:t>
             </a:r>
             <a:endParaRPr lang="en-US" dirty="0"/>
@@ -583,7 +587,7 @@
           <a:p>
             <a:fld id="{CA4DEABC-F80B-F54D-B945-95EA34AC4842}" type="datetimeFigureOut">
               <a:rPr lang="en-US" smtClean="0"/>
-              <a:t>11/29/17</a:t>
+              <a:t>11/30/2017</a:t>
             </a:fld>
             <a:endParaRPr lang="en-US"/>
           </a:p>
@@ -672,7 +676,7 @@
           <a:lstStyle/>
           <a:p>
             <a:r>
-              <a:rPr lang="en-US" smtClean="0"/>
+              <a:rPr lang="en-US"/>
               <a:t>Click to edit Master title style</a:t>
             </a:r>
             <a:endParaRPr lang="en-US" dirty="0"/>
@@ -696,35 +700,35 @@
           <a:p>
             <a:pPr lvl="0"/>
             <a:r>
-              <a:rPr lang="en-US" smtClean="0"/>
+              <a:rPr lang="en-US"/>
               <a:t>Click to edit Master text styles</a:t>
             </a:r>
           </a:p>
           <a:p>
             <a:pPr lvl="1"/>
             <a:r>
-              <a:rPr lang="en-US" smtClean="0"/>
+              <a:rPr lang="en-US"/>
               <a:t>Second level</a:t>
             </a:r>
           </a:p>
           <a:p>
             <a:pPr lvl="2"/>
             <a:r>
-              <a:rPr lang="en-US" smtClean="0"/>
+              <a:rPr lang="en-US"/>
               <a:t>Third level</a:t>
             </a:r>
           </a:p>
           <a:p>
             <a:pPr lvl="3"/>
             <a:r>
-              <a:rPr lang="en-US" smtClean="0"/>
+              <a:rPr lang="en-US"/>
               <a:t>Fourth level</a:t>
             </a:r>
           </a:p>
           <a:p>
             <a:pPr lvl="4"/>
             <a:r>
-              <a:rPr lang="en-US" smtClean="0"/>
+              <a:rPr lang="en-US"/>
               <a:t>Fifth level</a:t>
             </a:r>
             <a:endParaRPr lang="en-US" dirty="0"/>
@@ -748,7 +752,7 @@
           <a:p>
             <a:fld id="{CA4DEABC-F80B-F54D-B945-95EA34AC4842}" type="datetimeFigureOut">
               <a:rPr lang="en-US" smtClean="0"/>
-              <a:t>11/29/17</a:t>
+              <a:t>11/30/2017</a:t>
             </a:fld>
             <a:endParaRPr lang="en-US"/>
           </a:p>
@@ -846,7 +850,7 @@
           </a:lstStyle>
           <a:p>
             <a:r>
-              <a:rPr lang="en-US" smtClean="0"/>
+              <a:rPr lang="en-US"/>
               <a:t>Click to edit Master title style</a:t>
             </a:r>
             <a:endParaRPr lang="en-US" dirty="0"/>
@@ -964,7 +968,7 @@
           <a:p>
             <a:pPr lvl="0"/>
             <a:r>
-              <a:rPr lang="en-US" smtClean="0"/>
+              <a:rPr lang="en-US"/>
               <a:t>Click to edit Master text styles</a:t>
             </a:r>
           </a:p>
@@ -987,7 +991,7 @@
           <a:p>
             <a:fld id="{CA4DEABC-F80B-F54D-B945-95EA34AC4842}" type="datetimeFigureOut">
               <a:rPr lang="en-US" smtClean="0"/>
-              <a:t>11/29/17</a:t>
+              <a:t>11/30/2017</a:t>
             </a:fld>
             <a:endParaRPr lang="en-US"/>
           </a:p>
@@ -1076,7 +1080,7 @@
           <a:lstStyle/>
           <a:p>
             <a:r>
-              <a:rPr lang="en-US" smtClean="0"/>
+              <a:rPr lang="en-US"/>
               <a:t>Click to edit Master title style</a:t>
             </a:r>
             <a:endParaRPr lang="en-US" dirty="0"/>
@@ -1105,35 +1109,35 @@
           <a:p>
             <a:pPr lvl="0"/>
             <a:r>
-              <a:rPr lang="en-US" smtClean="0"/>
+              <a:rPr lang="en-US"/>
               <a:t>Click to edit Master text styles</a:t>
             </a:r>
           </a:p>
           <a:p>
             <a:pPr lvl="1"/>
             <a:r>
-              <a:rPr lang="en-US" smtClean="0"/>
+              <a:rPr lang="en-US"/>
               <a:t>Second level</a:t>
             </a:r>
           </a:p>
           <a:p>
             <a:pPr lvl="2"/>
             <a:r>
-              <a:rPr lang="en-US" smtClean="0"/>
+              <a:rPr lang="en-US"/>
               <a:t>Third level</a:t>
             </a:r>
           </a:p>
           <a:p>
             <a:pPr lvl="3"/>
             <a:r>
-              <a:rPr lang="en-US" smtClean="0"/>
+              <a:rPr lang="en-US"/>
               <a:t>Fourth level</a:t>
             </a:r>
           </a:p>
           <a:p>
             <a:pPr lvl="4"/>
             <a:r>
-              <a:rPr lang="en-US" smtClean="0"/>
+              <a:rPr lang="en-US"/>
               <a:t>Fifth level</a:t>
             </a:r>
             <a:endParaRPr lang="en-US" dirty="0"/>
@@ -1162,35 +1166,35 @@
           <a:p>
             <a:pPr lvl="0"/>
             <a:r>
-              <a:rPr lang="en-US" smtClean="0"/>
+              <a:rPr lang="en-US"/>
               <a:t>Click to edit Master text styles</a:t>
             </a:r>
           </a:p>
           <a:p>
             <a:pPr lvl="1"/>
             <a:r>
-              <a:rPr lang="en-US" smtClean="0"/>
+              <a:rPr lang="en-US"/>
               <a:t>Second level</a:t>
             </a:r>
           </a:p>
           <a:p>
             <a:pPr lvl="2"/>
             <a:r>
-              <a:rPr lang="en-US" smtClean="0"/>
+              <a:rPr lang="en-US"/>
               <a:t>Third level</a:t>
             </a:r>
           </a:p>
           <a:p>
             <a:pPr lvl="3"/>
             <a:r>
-              <a:rPr lang="en-US" smtClean="0"/>
+              <a:rPr lang="en-US"/>
               <a:t>Fourth level</a:t>
             </a:r>
           </a:p>
           <a:p>
             <a:pPr lvl="4"/>
             <a:r>
-              <a:rPr lang="en-US" smtClean="0"/>
+              <a:rPr lang="en-US"/>
               <a:t>Fifth level</a:t>
             </a:r>
             <a:endParaRPr lang="en-US" dirty="0"/>
@@ -1214,7 +1218,7 @@
           <a:p>
             <a:fld id="{CA4DEABC-F80B-F54D-B945-95EA34AC4842}" type="datetimeFigureOut">
               <a:rPr lang="en-US" smtClean="0"/>
-              <a:t>11/29/17</a:t>
+              <a:t>11/30/2017</a:t>
             </a:fld>
             <a:endParaRPr lang="en-US"/>
           </a:p>
@@ -1308,7 +1312,7 @@
           <a:lstStyle/>
           <a:p>
             <a:r>
-              <a:rPr lang="en-US" smtClean="0"/>
+              <a:rPr lang="en-US"/>
               <a:t>Click to edit Master title style</a:t>
             </a:r>
             <a:endParaRPr lang="en-US" dirty="0"/>
@@ -1374,7 +1378,7 @@
           <a:p>
             <a:pPr lvl="0"/>
             <a:r>
-              <a:rPr lang="en-US" smtClean="0"/>
+              <a:rPr lang="en-US"/>
               <a:t>Click to edit Master text styles</a:t>
             </a:r>
           </a:p>
@@ -1402,35 +1406,35 @@
           <a:p>
             <a:pPr lvl="0"/>
             <a:r>
-              <a:rPr lang="en-US" smtClean="0"/>
+              <a:rPr lang="en-US"/>
               <a:t>Click to edit Master text styles</a:t>
             </a:r>
           </a:p>
           <a:p>
             <a:pPr lvl="1"/>
             <a:r>
-              <a:rPr lang="en-US" smtClean="0"/>
+              <a:rPr lang="en-US"/>
               <a:t>Second level</a:t>
             </a:r>
           </a:p>
           <a:p>
             <a:pPr lvl="2"/>
             <a:r>
-              <a:rPr lang="en-US" smtClean="0"/>
+              <a:rPr lang="en-US"/>
               <a:t>Third level</a:t>
             </a:r>
           </a:p>
           <a:p>
             <a:pPr lvl="3"/>
             <a:r>
-              <a:rPr lang="en-US" smtClean="0"/>
+              <a:rPr lang="en-US"/>
               <a:t>Fourth level</a:t>
             </a:r>
           </a:p>
           <a:p>
             <a:pPr lvl="4"/>
             <a:r>
-              <a:rPr lang="en-US" smtClean="0"/>
+              <a:rPr lang="en-US"/>
               <a:t>Fifth level</a:t>
             </a:r>
             <a:endParaRPr lang="en-US" dirty="0"/>
@@ -1496,7 +1500,7 @@
           <a:p>
             <a:pPr lvl="0"/>
             <a:r>
-              <a:rPr lang="en-US" smtClean="0"/>
+              <a:rPr lang="en-US"/>
               <a:t>Click to edit Master text styles</a:t>
             </a:r>
           </a:p>
@@ -1524,35 +1528,35 @@
           <a:p>
             <a:pPr lvl="0"/>
             <a:r>
-              <a:rPr lang="en-US" smtClean="0"/>
+              <a:rPr lang="en-US"/>
               <a:t>Click to edit Master text styles</a:t>
             </a:r>
           </a:p>
           <a:p>
             <a:pPr lvl="1"/>
             <a:r>
-              <a:rPr lang="en-US" smtClean="0"/>
+              <a:rPr lang="en-US"/>
               <a:t>Second level</a:t>
             </a:r>
           </a:p>
           <a:p>
             <a:pPr lvl="2"/>
             <a:r>
-              <a:rPr lang="en-US" smtClean="0"/>
+              <a:rPr lang="en-US"/>
               <a:t>Third level</a:t>
             </a:r>
           </a:p>
           <a:p>
             <a:pPr lvl="3"/>
             <a:r>
-              <a:rPr lang="en-US" smtClean="0"/>
+              <a:rPr lang="en-US"/>
               <a:t>Fourth level</a:t>
             </a:r>
           </a:p>
           <a:p>
             <a:pPr lvl="4"/>
             <a:r>
-              <a:rPr lang="en-US" smtClean="0"/>
+              <a:rPr lang="en-US"/>
               <a:t>Fifth level</a:t>
             </a:r>
             <a:endParaRPr lang="en-US" dirty="0"/>
@@ -1576,7 +1580,7 @@
           <a:p>
             <a:fld id="{CA4DEABC-F80B-F54D-B945-95EA34AC4842}" type="datetimeFigureOut">
               <a:rPr lang="en-US" smtClean="0"/>
-              <a:t>11/29/17</a:t>
+              <a:t>11/30/2017</a:t>
             </a:fld>
             <a:endParaRPr lang="en-US"/>
           </a:p>
@@ -1665,7 +1669,7 @@
           <a:lstStyle/>
           <a:p>
             <a:r>
-              <a:rPr lang="en-US" smtClean="0"/>
+              <a:rPr lang="en-US"/>
               <a:t>Click to edit Master title style</a:t>
             </a:r>
             <a:endParaRPr lang="en-US" dirty="0"/>
@@ -1689,7 +1693,7 @@
           <a:p>
             <a:fld id="{CA4DEABC-F80B-F54D-B945-95EA34AC4842}" type="datetimeFigureOut">
               <a:rPr lang="en-US" smtClean="0"/>
-              <a:t>11/29/17</a:t>
+              <a:t>11/30/2017</a:t>
             </a:fld>
             <a:endParaRPr lang="en-US"/>
           </a:p>
@@ -1779,7 +1783,7 @@
           <a:p>
             <a:fld id="{CA4DEABC-F80B-F54D-B945-95EA34AC4842}" type="datetimeFigureOut">
               <a:rPr lang="en-US" smtClean="0"/>
-              <a:t>11/29/17</a:t>
+              <a:t>11/30/2017</a:t>
             </a:fld>
             <a:endParaRPr lang="en-US"/>
           </a:p>
@@ -1877,7 +1881,7 @@
           </a:lstStyle>
           <a:p>
             <a:r>
-              <a:rPr lang="en-US" smtClean="0"/>
+              <a:rPr lang="en-US"/>
               <a:t>Click to edit Master title style</a:t>
             </a:r>
             <a:endParaRPr lang="en-US" dirty="0"/>
@@ -1934,35 +1938,35 @@
           <a:p>
             <a:pPr lvl="0"/>
             <a:r>
-              <a:rPr lang="en-US" smtClean="0"/>
+              <a:rPr lang="en-US"/>
               <a:t>Click to edit Master text styles</a:t>
             </a:r>
           </a:p>
           <a:p>
             <a:pPr lvl="1"/>
             <a:r>
-              <a:rPr lang="en-US" smtClean="0"/>
+              <a:rPr lang="en-US"/>
               <a:t>Second level</a:t>
             </a:r>
           </a:p>
           <a:p>
             <a:pPr lvl="2"/>
             <a:r>
-              <a:rPr lang="en-US" smtClean="0"/>
+              <a:rPr lang="en-US"/>
               <a:t>Third level</a:t>
             </a:r>
           </a:p>
           <a:p>
             <a:pPr lvl="3"/>
             <a:r>
-              <a:rPr lang="en-US" smtClean="0"/>
+              <a:rPr lang="en-US"/>
               <a:t>Fourth level</a:t>
             </a:r>
           </a:p>
           <a:p>
             <a:pPr lvl="4"/>
             <a:r>
-              <a:rPr lang="en-US" smtClean="0"/>
+              <a:rPr lang="en-US"/>
               <a:t>Fifth level</a:t>
             </a:r>
             <a:endParaRPr lang="en-US" dirty="0"/>
@@ -2028,7 +2032,7 @@
           <a:p>
             <a:pPr lvl="0"/>
             <a:r>
-              <a:rPr lang="en-US" smtClean="0"/>
+              <a:rPr lang="en-US"/>
               <a:t>Click to edit Master text styles</a:t>
             </a:r>
           </a:p>
@@ -2051,7 +2055,7 @@
           <a:p>
             <a:fld id="{CA4DEABC-F80B-F54D-B945-95EA34AC4842}" type="datetimeFigureOut">
               <a:rPr lang="en-US" smtClean="0"/>
-              <a:t>11/29/17</a:t>
+              <a:t>11/30/2017</a:t>
             </a:fld>
             <a:endParaRPr lang="en-US"/>
           </a:p>
@@ -2149,7 +2153,7 @@
           </a:lstStyle>
           <a:p>
             <a:r>
-              <a:rPr lang="en-US" smtClean="0"/>
+              <a:rPr lang="en-US"/>
               <a:t>Click to edit Master title style</a:t>
             </a:r>
             <a:endParaRPr lang="en-US" dirty="0"/>
@@ -2214,7 +2218,7 @@
           </a:lstStyle>
           <a:p>
             <a:r>
-              <a:rPr lang="en-US" smtClean="0"/>
+              <a:rPr lang="en-US"/>
               <a:t>Drag picture to placeholder or click icon to add</a:t>
             </a:r>
             <a:endParaRPr lang="en-US" dirty="0"/>
@@ -2280,7 +2284,7 @@
           <a:p>
             <a:pPr lvl="0"/>
             <a:r>
-              <a:rPr lang="en-US" smtClean="0"/>
+              <a:rPr lang="en-US"/>
               <a:t>Click to edit Master text styles</a:t>
             </a:r>
           </a:p>
@@ -2303,7 +2307,7 @@
           <a:p>
             <a:fld id="{CA4DEABC-F80B-F54D-B945-95EA34AC4842}" type="datetimeFigureOut">
               <a:rPr lang="en-US" smtClean="0"/>
-              <a:t>11/29/17</a:t>
+              <a:t>11/30/2017</a:t>
             </a:fld>
             <a:endParaRPr lang="en-US"/>
           </a:p>
@@ -2407,7 +2411,7 @@
           <a:lstStyle/>
           <a:p>
             <a:r>
-              <a:rPr lang="en-US" smtClean="0"/>
+              <a:rPr lang="en-US"/>
               <a:t>Click to edit Master title style</a:t>
             </a:r>
             <a:endParaRPr lang="en-US" dirty="0"/>
@@ -2441,35 +2445,35 @@
           <a:p>
             <a:pPr lvl="0"/>
             <a:r>
-              <a:rPr lang="en-US" smtClean="0"/>
+              <a:rPr lang="en-US"/>
               <a:t>Click to edit Master text styles</a:t>
             </a:r>
           </a:p>
           <a:p>
             <a:pPr lvl="1"/>
             <a:r>
-              <a:rPr lang="en-US" smtClean="0"/>
+              <a:rPr lang="en-US"/>
               <a:t>Second level</a:t>
             </a:r>
           </a:p>
           <a:p>
             <a:pPr lvl="2"/>
             <a:r>
-              <a:rPr lang="en-US" smtClean="0"/>
+              <a:rPr lang="en-US"/>
               <a:t>Third level</a:t>
             </a:r>
           </a:p>
           <a:p>
             <a:pPr lvl="3"/>
             <a:r>
-              <a:rPr lang="en-US" smtClean="0"/>
+              <a:rPr lang="en-US"/>
               <a:t>Fourth level</a:t>
             </a:r>
           </a:p>
           <a:p>
             <a:pPr lvl="4"/>
             <a:r>
-              <a:rPr lang="en-US" smtClean="0"/>
+              <a:rPr lang="en-US"/>
               <a:t>Fifth level</a:t>
             </a:r>
             <a:endParaRPr lang="en-US" dirty="0"/>
@@ -2511,7 +2515,7 @@
           <a:p>
             <a:fld id="{CA4DEABC-F80B-F54D-B945-95EA34AC4842}" type="datetimeFigureOut">
               <a:rPr lang="en-US" smtClean="0"/>
-              <a:t>11/29/17</a:t>
+              <a:t>11/30/2017</a:t>
             </a:fld>
             <a:endParaRPr lang="en-US"/>
           </a:p>
@@ -3211,7 +3215,7 @@
             <a:p>
               <a:pPr algn="ctr"/>
               <a:r>
-                <a:rPr lang="en-US" sz="8000" b="1" i="1" smtClean="0">
+                <a:rPr lang="en-US" sz="8000" b="1" i="1">
                   <a:solidFill>
                     <a:schemeClr val="bg1"/>
                   </a:solidFill>
@@ -3325,7 +3329,7 @@
           <a:p>
             <a:pPr algn="ctr"/>
             <a:r>
-              <a:rPr lang="en-US" sz="4400" b="1" dirty="0" err="1" smtClean="0">
+              <a:rPr lang="en-US" sz="4400" b="1" dirty="0" err="1">
                 <a:solidFill>
                   <a:schemeClr val="bg1"/>
                 </a:solidFill>
@@ -3333,7 +3337,7 @@
               <a:t>Suprabhat</a:t>
             </a:r>
             <a:r>
-              <a:rPr lang="en-US" sz="4400" b="1" dirty="0" smtClean="0">
+              <a:rPr lang="en-US" sz="4400" b="1" dirty="0">
                 <a:solidFill>
                   <a:schemeClr val="bg1"/>
                 </a:solidFill>
@@ -3341,7 +3345,7 @@
               <a:t> </a:t>
             </a:r>
             <a:r>
-              <a:rPr lang="en-US" sz="4400" b="1" dirty="0" err="1" smtClean="0">
+              <a:rPr lang="en-US" sz="4400" b="1" dirty="0" err="1">
                 <a:solidFill>
                   <a:schemeClr val="bg1"/>
                 </a:solidFill>
@@ -3349,7 +3353,7 @@
               <a:t>Gurrala</a:t>
             </a:r>
             <a:r>
-              <a:rPr lang="en-US" sz="2000" b="1" dirty="0" smtClean="0">
+              <a:rPr lang="en-US" sz="2000" b="1" dirty="0">
                 <a:solidFill>
                   <a:schemeClr val="bg1"/>
                 </a:solidFill>
@@ -3357,7 +3361,7 @@
               <a:t>, </a:t>
             </a:r>
             <a:r>
-              <a:rPr lang="en-US" sz="4400" b="1" dirty="0" smtClean="0">
+              <a:rPr lang="en-US" sz="4400" b="1" dirty="0">
                 <a:solidFill>
                   <a:schemeClr val="bg1"/>
                 </a:solidFill>
@@ -3365,7 +3369,7 @@
               <a:t>Marc </a:t>
             </a:r>
             <a:r>
-              <a:rPr lang="en-US" sz="4400" b="1" dirty="0" err="1" smtClean="0">
+              <a:rPr lang="en-US" sz="4400" b="1" dirty="0" err="1">
                 <a:solidFill>
                   <a:schemeClr val="bg1"/>
                 </a:solidFill>
@@ -3373,23 +3377,15 @@
               <a:t>Marone</a:t>
             </a:r>
             <a:r>
-              <a:rPr lang="en-US" sz="4400" b="1" dirty="0" smtClean="0">
+              <a:rPr lang="en-US" sz="4400" b="1" dirty="0">
                 <a:solidFill>
                   <a:schemeClr val="bg1"/>
                 </a:solidFill>
               </a:rPr>
-              <a:t>, </a:t>
-            </a:r>
-            <a:r>
-              <a:rPr lang="en-US" sz="4400" b="1" dirty="0" smtClean="0">
-                <a:solidFill>
-                  <a:schemeClr val="bg1"/>
-                </a:solidFill>
-              </a:rPr>
-              <a:t>Aniruddha Nadkarni, Farhan </a:t>
-            </a:r>
-            <a:r>
-              <a:rPr lang="en-US" sz="4400" b="1" dirty="0" err="1" smtClean="0">
+              <a:t>, Aniruddha Nadkarni, Farhan </a:t>
+            </a:r>
+            <a:r>
+              <a:rPr lang="en-US" sz="4400" b="1" dirty="0" err="1">
                 <a:solidFill>
                   <a:schemeClr val="bg1"/>
                 </a:solidFill>
@@ -3397,7 +3393,7 @@
               <a:t>Tejani</a:t>
             </a:r>
             <a:r>
-              <a:rPr lang="en-US" sz="4400" b="1" dirty="0" smtClean="0">
+              <a:rPr lang="en-US" sz="4400" b="1" dirty="0">
                 <a:solidFill>
                   <a:schemeClr val="bg1"/>
                 </a:solidFill>
@@ -3405,7 +3401,7 @@
               <a:t>, and </a:t>
             </a:r>
             <a:r>
-              <a:rPr lang="en-US" sz="4400" b="1" dirty="0" err="1" smtClean="0">
+              <a:rPr lang="en-US" sz="4400" b="1" dirty="0" err="1">
                 <a:solidFill>
                   <a:schemeClr val="bg1"/>
                 </a:solidFill>
@@ -3413,91 +3409,46 @@
               <a:t>Kexin</a:t>
             </a:r>
             <a:r>
-              <a:rPr lang="en-US" sz="4400" b="1" dirty="0" smtClean="0">
+              <a:rPr lang="en-US" sz="4400" b="1" dirty="0">
                 <a:solidFill>
                   <a:schemeClr val="bg1"/>
                 </a:solidFill>
               </a:rPr>
-              <a:t> </a:t>
-            </a:r>
-            <a:r>
-              <a:rPr lang="en-US" sz="4400" b="1" dirty="0" smtClean="0">
+              <a:t> Zhang</a:t>
+            </a:r>
+          </a:p>
+        </p:txBody>
+      </p:sp>
+      <p:sp>
+        <p:nvSpPr>
+          <p:cNvPr id="23" name="TextBox 22"/>
+          <p:cNvSpPr txBox="1"/>
+          <p:nvPr/>
+        </p:nvSpPr>
+        <p:spPr>
+          <a:xfrm>
+            <a:off x="7996794" y="4082691"/>
+            <a:ext cx="11064148" cy="1261884"/>
+          </a:xfrm>
+          <a:prstGeom prst="rect">
+            <a:avLst/>
+          </a:prstGeom>
+          <a:noFill/>
+        </p:spPr>
+        <p:txBody>
+          <a:bodyPr wrap="square" rtlCol="0">
+            <a:spAutoFit/>
+          </a:bodyPr>
+          <a:lstStyle/>
+          <a:p>
+            <a:pPr algn="ctr"/>
+            <a:r>
+              <a:rPr lang="en-US" sz="4400" b="1" dirty="0">
                 <a:solidFill>
                   <a:schemeClr val="bg1"/>
                 </a:solidFill>
               </a:rPr>
-              <a:t>Zhang</a:t>
-            </a:r>
-            <a:endParaRPr lang="en-US" sz="4400" b="1" dirty="0">
-              <a:solidFill>
-                <a:schemeClr val="bg1"/>
-              </a:solidFill>
-            </a:endParaRPr>
-          </a:p>
-        </p:txBody>
-      </p:sp>
-      <p:sp>
-        <p:nvSpPr>
-          <p:cNvPr id="23" name="TextBox 22"/>
-          <p:cNvSpPr txBox="1"/>
-          <p:nvPr/>
-        </p:nvSpPr>
-        <p:spPr>
-          <a:xfrm>
-            <a:off x="7996794" y="4082691"/>
-            <a:ext cx="11064148" cy="1261884"/>
-          </a:xfrm>
-          <a:prstGeom prst="rect">
-            <a:avLst/>
-          </a:prstGeom>
-          <a:noFill/>
-        </p:spPr>
-        <p:txBody>
-          <a:bodyPr wrap="square" rtlCol="0">
-            <a:spAutoFit/>
-          </a:bodyPr>
-          <a:lstStyle/>
-          <a:p>
-            <a:pPr algn="ctr"/>
-            <a:r>
-              <a:rPr lang="en-US" sz="4400" b="1" dirty="0" smtClean="0">
-                <a:solidFill>
-                  <a:schemeClr val="bg1"/>
-                </a:solidFill>
-              </a:rPr>
-              <a:t>CX </a:t>
-            </a:r>
-            <a:r>
-              <a:rPr lang="en-US" sz="4400" b="1" dirty="0" smtClean="0">
-                <a:solidFill>
-                  <a:schemeClr val="bg1"/>
-                </a:solidFill>
-              </a:rPr>
-              <a:t>4242</a:t>
-            </a:r>
-            <a:r>
-              <a:rPr lang="en-US" sz="4400" b="1" dirty="0" smtClean="0">
-                <a:solidFill>
-                  <a:schemeClr val="bg1"/>
-                </a:solidFill>
-              </a:rPr>
-              <a:t>, </a:t>
-            </a:r>
-            <a:r>
-              <a:rPr lang="en-US" sz="4400" b="1" dirty="0" smtClean="0">
-                <a:solidFill>
-                  <a:schemeClr val="bg1"/>
-                </a:solidFill>
-              </a:rPr>
-              <a:t>Georgia </a:t>
-            </a:r>
-            <a:r>
-              <a:rPr lang="en-US" sz="4400" b="1" dirty="0" smtClean="0">
-                <a:solidFill>
-                  <a:schemeClr val="bg1"/>
-                </a:solidFill>
-              </a:rPr>
-              <a:t>Institute of Technology</a:t>
+              <a:t>CX 4242, Georgia Institute of Technology</a:t>
             </a:r>
           </a:p>
           <a:p>
@@ -3533,7 +3484,7 @@
           <a:lstStyle/>
           <a:p>
             <a:r>
-              <a:rPr lang="en-US" sz="7200" b="1" dirty="0" smtClean="0">
+              <a:rPr lang="en-US" sz="7200" b="1" dirty="0">
                 <a:solidFill>
                   <a:srgbClr val="FD5C63"/>
                 </a:solidFill>
@@ -3543,14 +3494,6 @@
               </a:rPr>
               <a:t>Motivation</a:t>
             </a:r>
-            <a:endParaRPr lang="en-US" sz="7200" b="1" dirty="0">
-              <a:solidFill>
-                <a:srgbClr val="FD5C63"/>
-              </a:solidFill>
-              <a:latin typeface="Century" charset="0"/>
-              <a:ea typeface="Century" charset="0"/>
-              <a:cs typeface="Century" charset="0"/>
-            </a:endParaRPr>
           </a:p>
         </p:txBody>
       </p:sp>
@@ -3578,14 +3521,14 @@
           <a:p>
             <a:pPr algn="ctr"/>
             <a:r>
-              <a:rPr lang="en-US" sz="4000" b="1" dirty="0" smtClean="0"/>
+              <a:rPr lang="en-US" sz="4000" b="1" dirty="0"/>
               <a:t>What options do short-term stay customers have?</a:t>
             </a:r>
           </a:p>
           <a:p>
             <a:pPr algn="just"/>
             <a:r>
-              <a:rPr lang="en-US" sz="2400" dirty="0" smtClean="0"/>
+              <a:rPr lang="en-US" sz="2400" dirty="0"/>
               <a:t>The sharing economy has taken over a number of consumer industries, providing customers with many alternatives to traditional housing or transportation,  with Airbnb being a major player in the space.</a:t>
             </a:r>
           </a:p>
@@ -3615,14 +3558,14 @@
           <a:p>
             <a:pPr algn="ctr"/>
             <a:r>
-              <a:rPr lang="en-US" sz="4000" b="1" dirty="0" smtClean="0"/>
+              <a:rPr lang="en-US" sz="4000" b="1" dirty="0"/>
               <a:t>How do these options compare?</a:t>
             </a:r>
           </a:p>
           <a:p>
             <a:pPr algn="just"/>
             <a:r>
-              <a:rPr lang="en-US" sz="2400" dirty="0" smtClean="0"/>
+              <a:rPr lang="en-US" sz="2400" dirty="0"/>
               <a:t>Options like Airbnb provide a wide variety of choices for consumers, but these also vary dramatically in the amenities provided and level of comfort, often unbeknownst to the customer. Hotels have a far more rigid pricing model, but the level of care is easily anticipated.</a:t>
             </a:r>
           </a:p>
@@ -3652,14 +3595,14 @@
           <a:p>
             <a:pPr algn="ctr"/>
             <a:r>
-              <a:rPr lang="en-US" sz="4000" b="1" dirty="0" smtClean="0"/>
+              <a:rPr lang="en-US" sz="4000" b="1" dirty="0"/>
               <a:t>Is there a clear winner?</a:t>
             </a:r>
           </a:p>
           <a:p>
             <a:pPr algn="just"/>
             <a:r>
-              <a:rPr lang="en-US" sz="2400" dirty="0" smtClean="0"/>
+              <a:rPr lang="en-US" sz="2400" dirty="0"/>
               <a:t>We have conducted analyses on Airbnb and Hotel options in New York City. By identifying similar bookings across the two platforms, we determine which option provides the best return on investment for consumers. </a:t>
             </a:r>
           </a:p>
@@ -3688,7 +3631,7 @@
           <a:lstStyle/>
           <a:p>
             <a:r>
-              <a:rPr lang="en-US" sz="7200" b="1" dirty="0" smtClean="0">
+              <a:rPr lang="en-US" sz="7200" b="1" dirty="0">
                 <a:solidFill>
                   <a:srgbClr val="FD5C63"/>
                 </a:solidFill>
@@ -3698,14 +3641,6 @@
               </a:rPr>
               <a:t>Approaches</a:t>
             </a:r>
-            <a:endParaRPr lang="en-US" sz="7200" b="1" dirty="0">
-              <a:solidFill>
-                <a:srgbClr val="FD5C63"/>
-              </a:solidFill>
-              <a:latin typeface="Century" charset="0"/>
-              <a:ea typeface="Century" charset="0"/>
-              <a:cs typeface="Century" charset="0"/>
-            </a:endParaRPr>
           </a:p>
         </p:txBody>
       </p:sp>
@@ -3733,16 +3668,12 @@
           <a:p>
             <a:pPr algn="ctr"/>
             <a:r>
-              <a:rPr lang="en-US" sz="4000" b="1" dirty="0" smtClean="0">
+              <a:rPr lang="en-US" sz="4000" b="1" dirty="0">
                 <a:ea typeface="Century" charset="0"/>
                 <a:cs typeface="Century" charset="0"/>
               </a:rPr>
               <a:t>Cluster Analysis</a:t>
             </a:r>
-            <a:endParaRPr lang="en-US" sz="4000" b="1" dirty="0">
-              <a:ea typeface="Century" charset="0"/>
-              <a:cs typeface="Century" charset="0"/>
-            </a:endParaRPr>
           </a:p>
         </p:txBody>
       </p:sp>
@@ -3769,16 +3700,12 @@
           <a:lstStyle/>
           <a:p>
             <a:r>
-              <a:rPr lang="en-US" sz="4000" b="1" dirty="0" smtClean="0">
+              <a:rPr lang="en-US" sz="4000" b="1" dirty="0">
                 <a:ea typeface="Century" charset="0"/>
                 <a:cs typeface="Century" charset="0"/>
               </a:rPr>
               <a:t>Pricing Over Time</a:t>
             </a:r>
-            <a:endParaRPr lang="en-US" sz="4000" b="1" dirty="0">
-              <a:ea typeface="Century" charset="0"/>
-              <a:cs typeface="Century" charset="0"/>
-            </a:endParaRPr>
           </a:p>
         </p:txBody>
       </p:sp>
@@ -3835,15 +3762,15 @@
           <a:lstStyle/>
           <a:p>
             <a:r>
-              <a:rPr lang="en-US" sz="2400" dirty="0" smtClean="0"/>
+              <a:rPr lang="en-US" sz="2400" dirty="0"/>
               <a:t>Airbnb pricing data was gathered by scraping using </a:t>
             </a:r>
             <a:r>
-              <a:rPr lang="en-US" sz="2400" b="1" dirty="0" smtClean="0"/>
+              <a:rPr lang="en-US" sz="2400" b="1" dirty="0"/>
               <a:t>Selenium</a:t>
             </a:r>
             <a:r>
-              <a:rPr lang="en-US" sz="2400" dirty="0" smtClean="0"/>
+              <a:rPr lang="en-US" sz="2400" dirty="0"/>
               <a:t>, a web scraping tool for Python</a:t>
             </a:r>
           </a:p>
@@ -3873,7 +3800,7 @@
           <a:p>
             <a:pPr algn="r"/>
             <a:r>
-              <a:rPr lang="en-US" sz="2400" dirty="0" smtClean="0"/>
+              <a:rPr lang="en-US" sz="2400" dirty="0"/>
               <a:t>Amadeus, a travel technology company, provided us with the pricing data over time for the traditional hotels.</a:t>
             </a:r>
           </a:p>
@@ -3903,7 +3830,7 @@
           <a:p>
             <a:pPr algn="ctr"/>
             <a:r>
-              <a:rPr lang="en-US" sz="4000" b="1" dirty="0" smtClean="0">
+              <a:rPr lang="en-US" sz="4000" b="1" dirty="0">
                 <a:ea typeface="Century" charset="0"/>
                 <a:cs typeface="Century" charset="0"/>
               </a:rPr>
@@ -3950,7 +3877,7 @@
         </p:nvSpPr>
         <p:spPr>
           <a:xfrm>
-            <a:off x="6157042" y="26129417"/>
+            <a:off x="6448055" y="31989954"/>
             <a:ext cx="2445488" cy="2585323"/>
           </a:xfrm>
           <a:prstGeom prst="rect">
@@ -3970,14 +3897,9 @@
           <a:lstStyle/>
           <a:p>
             <a:r>
-              <a:rPr lang="en-US" smtClean="0"/>
-              <a:t>Tre </a:t>
-            </a:r>
-            <a:r>
-              <a:rPr lang="en-US" dirty="0" smtClean="0"/>
-              <a:t>goes here</a:t>
-            </a:r>
-            <a:endParaRPr lang="en-US" dirty="0"/>
+              <a:rPr lang="en-US" dirty="0"/>
+              <a:t>Tre goes here</a:t>
+            </a:r>
           </a:p>
         </p:txBody>
       </p:sp>
@@ -4004,16 +3926,12 @@
           <a:lstStyle/>
           <a:p>
             <a:r>
-              <a:rPr lang="en-US" sz="4000" b="1" dirty="0" smtClean="0">
+              <a:rPr lang="en-US" sz="4000" b="1" dirty="0">
                 <a:ea typeface="Century" charset="0"/>
                 <a:cs typeface="Century" charset="0"/>
               </a:rPr>
               <a:t>Location</a:t>
             </a:r>
-            <a:endParaRPr lang="en-US" sz="4000" b="1" dirty="0">
-              <a:ea typeface="Century" charset="0"/>
-              <a:cs typeface="Century" charset="0"/>
-            </a:endParaRPr>
           </a:p>
         </p:txBody>
       </p:sp>
@@ -4040,7 +3958,7 @@
           <a:lstStyle/>
           <a:p>
             <a:r>
-              <a:rPr lang="en-US" sz="7200" b="1" dirty="0" smtClean="0">
+              <a:rPr lang="en-US" sz="7200" b="1" dirty="0">
                 <a:solidFill>
                   <a:srgbClr val="FD5C63"/>
                 </a:solidFill>
@@ -4050,14 +3968,6 @@
               </a:rPr>
               <a:t>Results</a:t>
             </a:r>
-            <a:endParaRPr lang="en-US" sz="7200" b="1" dirty="0">
-              <a:solidFill>
-                <a:srgbClr val="FD5C63"/>
-              </a:solidFill>
-              <a:latin typeface="Century" charset="0"/>
-              <a:ea typeface="Century" charset="0"/>
-              <a:cs typeface="Century" charset="0"/>
-            </a:endParaRPr>
           </a:p>
         </p:txBody>
       </p:sp>
@@ -4115,7 +4025,7 @@
           <a:p>
             <a:pPr algn="r"/>
             <a:r>
-              <a:rPr lang="en-US" sz="2400" dirty="0" smtClean="0"/>
+              <a:rPr lang="en-US" sz="2400" dirty="0"/>
               <a:t>The Amadeus API provided a number of reviews for hotels, and that data was augmented by scraping reviews from TripAdvisor</a:t>
             </a:r>
           </a:p>
@@ -4144,16 +4054,12 @@
           <a:lstStyle/>
           <a:p>
             <a:r>
-              <a:rPr lang="en-US" sz="4000" b="1" dirty="0" smtClean="0">
+              <a:rPr lang="en-US" sz="4000" b="1" dirty="0">
                 <a:ea typeface="Century" charset="0"/>
                 <a:cs typeface="Century" charset="0"/>
               </a:rPr>
               <a:t>Reviews</a:t>
             </a:r>
-            <a:endParaRPr lang="en-US" sz="4000" b="1" dirty="0">
-              <a:ea typeface="Century" charset="0"/>
-              <a:cs typeface="Century" charset="0"/>
-            </a:endParaRPr>
           </a:p>
         </p:txBody>
       </p:sp>
@@ -4180,7 +4086,7 @@
           <a:lstStyle/>
           <a:p>
             <a:r>
-              <a:rPr lang="en-US" sz="2400" dirty="0" smtClean="0"/>
+              <a:rPr lang="en-US" sz="2400" dirty="0"/>
               <a:t>We used Inside Airbnb, a data collection platform that gathered the listing reviews from Airbnb itself and compiled them into a dataset.  </a:t>
             </a:r>
           </a:p>
@@ -4238,7 +4144,7 @@
           <a:lstStyle/>
           <a:p>
             <a:r>
-              <a:rPr lang="en-US" sz="2400" dirty="0" smtClean="0"/>
+              <a:rPr lang="en-US" sz="2400" dirty="0"/>
               <a:t>The Inside Airbnb dataset also included columns for Location, in the form of Latitude and Longitude coordinates.</a:t>
             </a:r>
           </a:p>
@@ -4268,15 +4174,15 @@
           <a:p>
             <a:pPr algn="r"/>
             <a:r>
-              <a:rPr lang="en-US" sz="2400" dirty="0" smtClean="0"/>
+              <a:rPr lang="en-US" sz="2400" dirty="0"/>
               <a:t>We utilized the </a:t>
             </a:r>
             <a:r>
-              <a:rPr lang="en-US" sz="2400" dirty="0" err="1" smtClean="0"/>
+              <a:rPr lang="en-US" sz="2400" dirty="0" err="1"/>
               <a:t>OpenStreetMap</a:t>
             </a:r>
             <a:r>
-              <a:rPr lang="en-US" sz="2400" dirty="0" smtClean="0"/>
+              <a:rPr lang="en-US" sz="2400" dirty="0"/>
               <a:t> API to convert the hotel addresses to Latitude and Longitude coordinates.</a:t>
             </a:r>
           </a:p>
@@ -4335,16 +4241,12 @@
           <a:lstStyle/>
           <a:p>
             <a:r>
-              <a:rPr lang="en-US" sz="4000" b="1" dirty="0" smtClean="0">
+              <a:rPr lang="en-US" sz="4000" b="1" dirty="0">
                 <a:ea typeface="Century" charset="0"/>
                 <a:cs typeface="Century" charset="0"/>
               </a:rPr>
               <a:t>Amenities</a:t>
             </a:r>
-            <a:endParaRPr lang="en-US" sz="4000" b="1" dirty="0">
-              <a:ea typeface="Century" charset="0"/>
-              <a:cs typeface="Century" charset="0"/>
-            </a:endParaRPr>
           </a:p>
         </p:txBody>
       </p:sp>
@@ -4371,15 +4273,15 @@
           <a:lstStyle/>
           <a:p>
             <a:r>
-              <a:rPr lang="en-US" sz="2400" dirty="0" smtClean="0"/>
+              <a:rPr lang="en-US" sz="2400" dirty="0"/>
               <a:t>Amenities for </a:t>
             </a:r>
             <a:r>
-              <a:rPr lang="en-US" sz="2400" dirty="0" err="1" smtClean="0"/>
+              <a:rPr lang="en-US" sz="2400" dirty="0" err="1"/>
               <a:t>Airbnbs</a:t>
             </a:r>
             <a:r>
-              <a:rPr lang="en-US" sz="2400" dirty="0" smtClean="0"/>
+              <a:rPr lang="en-US" sz="2400" dirty="0"/>
               <a:t> include kitchens, television, air conditioning, and others, and were included in the Inside Airbnb dataset.</a:t>
             </a:r>
           </a:p>
@@ -4409,7 +4311,7 @@
           <a:p>
             <a:pPr algn="r"/>
             <a:r>
-              <a:rPr lang="en-US" sz="2400" dirty="0" smtClean="0"/>
+              <a:rPr lang="en-US" sz="2400" dirty="0"/>
               <a:t>The hotel amenities data was provided by Amadeus and by TripAdvisor, and included data such as gyms, refrigerators, kid-friendliness, and others.</a:t>
             </a:r>
           </a:p>
@@ -4438,16 +4340,12 @@
           <a:lstStyle/>
           <a:p>
             <a:r>
-              <a:rPr lang="en-US" sz="7200" b="1" i="1" dirty="0" smtClean="0">
+              <a:rPr lang="en-US" sz="7200" b="1" i="1" dirty="0">
                 <a:ea typeface="Century" charset="0"/>
                 <a:cs typeface="Century" charset="0"/>
               </a:rPr>
               <a:t>Airbnb</a:t>
             </a:r>
-            <a:endParaRPr lang="en-US" sz="7200" b="1" i="1" dirty="0">
-              <a:ea typeface="Century" charset="0"/>
-              <a:cs typeface="Century" charset="0"/>
-            </a:endParaRPr>
           </a:p>
         </p:txBody>
       </p:sp>
@@ -4474,16 +4372,12 @@
           <a:lstStyle/>
           <a:p>
             <a:r>
-              <a:rPr lang="en-US" sz="7200" b="1" i="1" dirty="0" smtClean="0">
+              <a:rPr lang="en-US" sz="7200" b="1" i="1" dirty="0">
                 <a:ea typeface="Century" charset="0"/>
                 <a:cs typeface="Century" charset="0"/>
               </a:rPr>
               <a:t>Hotels</a:t>
             </a:r>
-            <a:endParaRPr lang="en-US" sz="7200" b="1" i="1" dirty="0">
-              <a:ea typeface="Century" charset="0"/>
-              <a:cs typeface="Century" charset="0"/>
-            </a:endParaRPr>
           </a:p>
         </p:txBody>
       </p:sp>
@@ -4556,7 +4450,7 @@
           <a:p>
             <a:pPr algn="ctr"/>
             <a:r>
-              <a:rPr lang="en-US" sz="4000" b="1" dirty="0" smtClean="0">
+              <a:rPr lang="en-US" sz="4000" b="1" dirty="0">
                 <a:ea typeface="Century" charset="0"/>
                 <a:cs typeface="Century" charset="0"/>
               </a:rPr>
@@ -4588,7 +4482,7 @@
           <a:lstStyle/>
           <a:p>
             <a:r>
-              <a:rPr lang="en-US" sz="7200" b="1" dirty="0" smtClean="0">
+              <a:rPr lang="en-US" sz="7200" b="1" dirty="0">
                 <a:solidFill>
                   <a:srgbClr val="FD5C63"/>
                 </a:solidFill>
@@ -4598,14 +4492,122 @@
               </a:rPr>
               <a:t>Data Gathering</a:t>
             </a:r>
-            <a:endParaRPr lang="en-US" sz="7200" b="1" dirty="0">
-              <a:solidFill>
-                <a:srgbClr val="FD5C63"/>
-              </a:solidFill>
-              <a:latin typeface="Century" charset="0"/>
-              <a:ea typeface="Century" charset="0"/>
-              <a:cs typeface="Century" charset="0"/>
-            </a:endParaRPr>
+          </a:p>
+        </p:txBody>
+      </p:sp>
+      <p:sp>
+        <p:nvSpPr>
+          <p:cNvPr id="2" name="TextBox 1">
+            <a:extLst>
+              <a:ext uri="{FF2B5EF4-FFF2-40B4-BE49-F238E27FC236}">
+                <a16:creationId xmlns:a16="http://schemas.microsoft.com/office/drawing/2014/main" id="{A3AC744B-A413-453F-9FC4-89AC446C322E}"/>
+              </a:ext>
+            </a:extLst>
+          </p:cNvPr>
+          <p:cNvSpPr txBox="1"/>
+          <p:nvPr/>
+        </p:nvSpPr>
+        <p:spPr>
+          <a:xfrm>
+            <a:off x="643686" y="25476272"/>
+            <a:ext cx="4155104" cy="7848302"/>
+          </a:xfrm>
+          <a:prstGeom prst="rect">
+            <a:avLst/>
+          </a:prstGeom>
+          <a:noFill/>
+        </p:spPr>
+        <p:txBody>
+          <a:bodyPr wrap="square" rtlCol="0">
+            <a:spAutoFit/>
+          </a:bodyPr>
+          <a:lstStyle/>
+          <a:p>
+            <a:r>
+              <a:rPr lang="en-US" sz="2400" dirty="0"/>
+              <a:t>Attempted to cluster by:</a:t>
+            </a:r>
+          </a:p>
+          <a:p>
+            <a:pPr marL="228600" indent="-228600">
+              <a:buFont typeface="Arial" panose="020B0604020202020204" pitchFamily="34" charset="0"/>
+              <a:buChar char="•"/>
+            </a:pPr>
+            <a:r>
+              <a:rPr lang="en-US" sz="2400" b="1" dirty="0"/>
+              <a:t>Latitude/longitude grid:</a:t>
+            </a:r>
+          </a:p>
+          <a:p>
+            <a:pPr marL="228600"/>
+            <a:r>
+              <a:rPr lang="en-US" sz="2400" dirty="0"/>
+              <a:t>The hotel locations were too spread out to have a good distribution.</a:t>
+            </a:r>
+          </a:p>
+          <a:p>
+            <a:pPr marL="228600" indent="-228600">
+              <a:buFont typeface="Arial" panose="020B0604020202020204" pitchFamily="34" charset="0"/>
+              <a:buChar char="•"/>
+            </a:pPr>
+            <a:r>
+              <a:rPr lang="en-US" sz="2400" b="1" dirty="0" err="1"/>
+              <a:t>Voronoi</a:t>
+            </a:r>
+            <a:r>
+              <a:rPr lang="en-US" sz="2400" b="1" dirty="0"/>
+              <a:t> – Nearest subway:</a:t>
+            </a:r>
+          </a:p>
+          <a:p>
+            <a:pPr marL="228600"/>
+            <a:r>
+              <a:rPr lang="en-US" sz="2400" dirty="0"/>
+              <a:t>Sparse cells were too large and dense cells were broken up into too many small cells</a:t>
+            </a:r>
+          </a:p>
+          <a:p>
+            <a:pPr marL="228600" indent="-228600">
+              <a:buFont typeface="Arial" panose="020B0604020202020204" pitchFamily="34" charset="0"/>
+              <a:buChar char="•"/>
+            </a:pPr>
+            <a:r>
+              <a:rPr lang="en-US" sz="2400" b="1" dirty="0" err="1"/>
+              <a:t>Voronoi</a:t>
+            </a:r>
+            <a:r>
+              <a:rPr lang="en-US" sz="2400" b="1" dirty="0"/>
+              <a:t> – K Means Centroid:</a:t>
+            </a:r>
+          </a:p>
+          <a:p>
+            <a:pPr marL="228600"/>
+            <a:r>
+              <a:rPr lang="en-US" sz="2400" dirty="0"/>
+              <a:t>Clustering using the centroid of hotel locations gave us 130 centers to create </a:t>
+            </a:r>
+            <a:r>
+              <a:rPr lang="en-US" sz="2400" dirty="0" err="1"/>
+              <a:t>Voronoi</a:t>
+            </a:r>
+            <a:r>
+              <a:rPr lang="en-US" sz="2400" dirty="0"/>
+              <a:t> cells with a reasonable distribution of listings. 36% of Airbnb listings were disregarded for being too far away from a center.</a:t>
+            </a:r>
+          </a:p>
+          <a:p>
+            <a:endParaRPr lang="en-US" sz="2400" dirty="0"/>
+          </a:p>
+          <a:p>
+            <a:pPr marL="228600"/>
+            <a:endParaRPr lang="en-US" sz="2400" dirty="0"/>
+          </a:p>
+          <a:p>
+            <a:pPr marL="914400" indent="-457200">
+              <a:buFont typeface="Courier New" panose="02070309020205020404" pitchFamily="49" charset="0"/>
+              <a:buChar char="o"/>
+            </a:pPr>
+            <a:endParaRPr lang="en-US" sz="2400" dirty="0"/>
           </a:p>
         </p:txBody>
       </p:sp>

</xml_diff>

<commit_message>
Reworded K means bullet
</commit_message>
<xml_diff>
--- a/presentation_materials/Poster.pptx
+++ b/presentation_materials/Poster.pptx
@@ -4584,15 +4584,7 @@
             <a:pPr marL="228600"/>
             <a:r>
               <a:rPr lang="en-US" sz="2400" dirty="0"/>
-              <a:t>Clustering using the centroid of hotel locations gave us 130 centers to create </a:t>
-            </a:r>
-            <a:r>
-              <a:rPr lang="en-US" sz="2400" dirty="0" err="1"/>
-              <a:t>Voronoi</a:t>
-            </a:r>
-            <a:r>
-              <a:rPr lang="en-US" sz="2400" dirty="0"/>
-              <a:t> cells with a reasonable distribution of listings. 36% of Airbnb listings were disregarded for being too far away from a center.</a:t>
+              <a:t>Clustered only hotel locations only with k=130 and then assigned each Airbnb listing to a centroid if they were within 1km. 36% of Airbnb listings were disregarded for being too far away from a center.</a:t>
             </a:r>
           </a:p>
           <a:p>

</xml_diff>

<commit_message>
Added unified search bullets
</commit_message>
<xml_diff>
--- a/presentation_materials/Poster.pptx
+++ b/presentation_materials/Poster.pptx
@@ -4603,6 +4603,99 @@
           </a:p>
         </p:txBody>
       </p:sp>
+      <p:sp>
+        <p:nvSpPr>
+          <p:cNvPr id="48" name="TextBox 47">
+            <a:extLst>
+              <a:ext uri="{FF2B5EF4-FFF2-40B4-BE49-F238E27FC236}">
+                <a16:creationId xmlns:a16="http://schemas.microsoft.com/office/drawing/2014/main" id="{336120FB-16EA-49FF-8065-0AB0747A91C9}"/>
+              </a:ext>
+            </a:extLst>
+          </p:cNvPr>
+          <p:cNvSpPr txBox="1"/>
+          <p:nvPr/>
+        </p:nvSpPr>
+        <p:spPr>
+          <a:xfrm>
+            <a:off x="11889223" y="25535741"/>
+            <a:ext cx="3505266" cy="5632311"/>
+          </a:xfrm>
+          <a:prstGeom prst="rect">
+            <a:avLst/>
+          </a:prstGeom>
+          <a:noFill/>
+        </p:spPr>
+        <p:txBody>
+          <a:bodyPr wrap="square" rtlCol="0">
+            <a:spAutoFit/>
+          </a:bodyPr>
+          <a:lstStyle/>
+          <a:p>
+            <a:pPr marL="342900" indent="-342900">
+              <a:buFont typeface="Arial" panose="020B0604020202020204" pitchFamily="34" charset="0"/>
+              <a:buChar char="•"/>
+            </a:pPr>
+            <a:r>
+              <a:rPr lang="en-US" sz="2400" dirty="0" err="1"/>
+              <a:t>ElasticSearch</a:t>
+            </a:r>
+            <a:r>
+              <a:rPr lang="en-US" sz="2400" dirty="0"/>
+              <a:t> as a database and search backend. </a:t>
+            </a:r>
+          </a:p>
+          <a:p>
+            <a:pPr marL="342900" indent="-342900">
+              <a:buFont typeface="Arial" panose="020B0604020202020204" pitchFamily="34" charset="0"/>
+              <a:buChar char="•"/>
+            </a:pPr>
+            <a:r>
+              <a:rPr lang="en-US" sz="2400" dirty="0"/>
+              <a:t>Convert search string to a latitude/longitude pair using </a:t>
+            </a:r>
+            <a:r>
+              <a:rPr lang="en-US" sz="2400" dirty="0" err="1"/>
+              <a:t>OpenStreetMap</a:t>
+            </a:r>
+            <a:r>
+              <a:rPr lang="en-US" sz="2400" dirty="0"/>
+              <a:t> API.</a:t>
+            </a:r>
+          </a:p>
+          <a:p>
+            <a:pPr marL="342900" indent="-342900">
+              <a:buFont typeface="Arial" panose="020B0604020202020204" pitchFamily="34" charset="0"/>
+              <a:buChar char="•"/>
+            </a:pPr>
+            <a:r>
+              <a:rPr lang="en-US" sz="2400" dirty="0"/>
+              <a:t>Feed this pair into an </a:t>
+            </a:r>
+            <a:r>
+              <a:rPr lang="en-US" sz="2400" dirty="0" err="1"/>
+              <a:t>ElasticSearch</a:t>
+            </a:r>
+            <a:r>
+              <a:rPr lang="en-US" sz="2400" dirty="0"/>
+              <a:t> location query which returns a unified list of nearest Airbnb and hotels.</a:t>
+            </a:r>
+          </a:p>
+          <a:p>
+            <a:endParaRPr lang="en-US" sz="2400" dirty="0"/>
+          </a:p>
+          <a:p>
+            <a:pPr marL="228600"/>
+            <a:endParaRPr lang="en-US" sz="2400" dirty="0"/>
+          </a:p>
+          <a:p>
+            <a:pPr marL="914400" indent="-457200">
+              <a:buFont typeface="Courier New" panose="02070309020205020404" pitchFamily="49" charset="0"/>
+              <a:buChar char="o"/>
+            </a:pPr>
+            <a:endParaRPr lang="en-US" sz="2400" dirty="0"/>
+          </a:p>
+        </p:txBody>
+      </p:sp>
     </p:spTree>
     <p:extLst>
       <p:ext uri="{BB962C8B-B14F-4D97-AF65-F5344CB8AC3E}">

</xml_diff>